<commit_message>
Update RFC 5 https://www.cskefu.com/2023/01/02/rfc5-cskefu_persona/
</commit_message>
<xml_diff>
--- a/rfcs/2023_01_02_RFC5_CSKeFu_Persona/RFC5_CSKeFu_Persona.pptx
+++ b/rfcs/2023_01_02_RFC5_CSKeFu_Persona/RFC5_CSKeFu_Persona.pptx
@@ -6,6 +6,7 @@
   </p:sldMasterIdLst>
   <p:sldIdLst>
     <p:sldId id="256" r:id="rId2"/>
+    <p:sldId id="257" r:id="rId3"/>
   </p:sldIdLst>
   <p:sldSz cx="12192000" cy="6858000"/>
   <p:notesSz cx="6858000" cy="9144000"/>
@@ -259,7 +260,7 @@
           <a:p>
             <a:fld id="{A3154338-70F7-44B8-9DFC-34170956A9AF}" type="datetimeFigureOut">
               <a:rPr lang="en-US" smtClean="0"/>
-              <a:t>1/2/2023</a:t>
+              <a:t>1/3/2023</a:t>
             </a:fld>
             <a:endParaRPr lang="en-US"/>
           </a:p>
@@ -457,7 +458,7 @@
           <a:p>
             <a:fld id="{A3154338-70F7-44B8-9DFC-34170956A9AF}" type="datetimeFigureOut">
               <a:rPr lang="en-US" smtClean="0"/>
-              <a:t>1/2/2023</a:t>
+              <a:t>1/3/2023</a:t>
             </a:fld>
             <a:endParaRPr lang="en-US"/>
           </a:p>
@@ -665,7 +666,7 @@
           <a:p>
             <a:fld id="{A3154338-70F7-44B8-9DFC-34170956A9AF}" type="datetimeFigureOut">
               <a:rPr lang="en-US" smtClean="0"/>
-              <a:t>1/2/2023</a:t>
+              <a:t>1/3/2023</a:t>
             </a:fld>
             <a:endParaRPr lang="en-US"/>
           </a:p>
@@ -863,7 +864,7 @@
           <a:p>
             <a:fld id="{A3154338-70F7-44B8-9DFC-34170956A9AF}" type="datetimeFigureOut">
               <a:rPr lang="en-US" smtClean="0"/>
-              <a:t>1/2/2023</a:t>
+              <a:t>1/3/2023</a:t>
             </a:fld>
             <a:endParaRPr lang="en-US"/>
           </a:p>
@@ -1138,7 +1139,7 @@
           <a:p>
             <a:fld id="{A3154338-70F7-44B8-9DFC-34170956A9AF}" type="datetimeFigureOut">
               <a:rPr lang="en-US" smtClean="0"/>
-              <a:t>1/2/2023</a:t>
+              <a:t>1/3/2023</a:t>
             </a:fld>
             <a:endParaRPr lang="en-US"/>
           </a:p>
@@ -1403,7 +1404,7 @@
           <a:p>
             <a:fld id="{A3154338-70F7-44B8-9DFC-34170956A9AF}" type="datetimeFigureOut">
               <a:rPr lang="en-US" smtClean="0"/>
-              <a:t>1/2/2023</a:t>
+              <a:t>1/3/2023</a:t>
             </a:fld>
             <a:endParaRPr lang="en-US"/>
           </a:p>
@@ -1815,7 +1816,7 @@
           <a:p>
             <a:fld id="{A3154338-70F7-44B8-9DFC-34170956A9AF}" type="datetimeFigureOut">
               <a:rPr lang="en-US" smtClean="0"/>
-              <a:t>1/2/2023</a:t>
+              <a:t>1/3/2023</a:t>
             </a:fld>
             <a:endParaRPr lang="en-US"/>
           </a:p>
@@ -1956,7 +1957,7 @@
           <a:p>
             <a:fld id="{A3154338-70F7-44B8-9DFC-34170956A9AF}" type="datetimeFigureOut">
               <a:rPr lang="en-US" smtClean="0"/>
-              <a:t>1/2/2023</a:t>
+              <a:t>1/3/2023</a:t>
             </a:fld>
             <a:endParaRPr lang="en-US"/>
           </a:p>
@@ -2069,7 +2070,7 @@
           <a:p>
             <a:fld id="{A3154338-70F7-44B8-9DFC-34170956A9AF}" type="datetimeFigureOut">
               <a:rPr lang="en-US" smtClean="0"/>
-              <a:t>1/2/2023</a:t>
+              <a:t>1/3/2023</a:t>
             </a:fld>
             <a:endParaRPr lang="en-US"/>
           </a:p>
@@ -2380,7 +2381,7 @@
           <a:p>
             <a:fld id="{A3154338-70F7-44B8-9DFC-34170956A9AF}" type="datetimeFigureOut">
               <a:rPr lang="en-US" smtClean="0"/>
-              <a:t>1/2/2023</a:t>
+              <a:t>1/3/2023</a:t>
             </a:fld>
             <a:endParaRPr lang="en-US"/>
           </a:p>
@@ -2668,7 +2669,7 @@
           <a:p>
             <a:fld id="{A3154338-70F7-44B8-9DFC-34170956A9AF}" type="datetimeFigureOut">
               <a:rPr lang="en-US" smtClean="0"/>
-              <a:t>1/2/2023</a:t>
+              <a:t>1/3/2023</a:t>
             </a:fld>
             <a:endParaRPr lang="en-US"/>
           </a:p>
@@ -2909,7 +2910,7 @@
           <a:p>
             <a:fld id="{A3154338-70F7-44B8-9DFC-34170956A9AF}" type="datetimeFigureOut">
               <a:rPr lang="en-US" smtClean="0"/>
-              <a:t>1/2/2023</a:t>
+              <a:t>1/3/2023</a:t>
             </a:fld>
             <a:endParaRPr lang="en-US"/>
           </a:p>
@@ -3628,6 +3629,129 @@
 </p:sld>
 </file>
 
+<file path=ppt/slides/slide2.xml><?xml version="1.0" encoding="utf-8"?>
+<p:sld xmlns:a="http://schemas.openxmlformats.org/drawingml/2006/main" xmlns:r="http://schemas.openxmlformats.org/officeDocument/2006/relationships" xmlns:p="http://schemas.openxmlformats.org/presentationml/2006/main">
+  <p:cSld>
+    <p:spTree>
+      <p:nvGrpSpPr>
+        <p:cNvPr id="1" name=""/>
+        <p:cNvGrpSpPr/>
+        <p:nvPr/>
+      </p:nvGrpSpPr>
+      <p:grpSpPr>
+        <a:xfrm>
+          <a:off x="0" y="0"/>
+          <a:ext cx="0" cy="0"/>
+          <a:chOff x="0" y="0"/>
+          <a:chExt cx="0" cy="0"/>
+        </a:xfrm>
+      </p:grpSpPr>
+      <p:grpSp>
+        <p:nvGrpSpPr>
+          <p:cNvPr id="8" name="组合 7">
+            <a:extLst>
+              <a:ext uri="{FF2B5EF4-FFF2-40B4-BE49-F238E27FC236}">
+                <a16:creationId xmlns:a16="http://schemas.microsoft.com/office/drawing/2014/main" id="{9283BEED-86B5-7D7B-6917-19742107DBAE}"/>
+              </a:ext>
+            </a:extLst>
+          </p:cNvPr>
+          <p:cNvGrpSpPr/>
+          <p:nvPr/>
+        </p:nvGrpSpPr>
+        <p:grpSpPr>
+          <a:xfrm>
+            <a:off x="931279" y="462168"/>
+            <a:ext cx="6937860" cy="6632558"/>
+            <a:chOff x="4183842" y="82591"/>
+            <a:chExt cx="6937860" cy="6632558"/>
+          </a:xfrm>
+        </p:grpSpPr>
+        <p:pic>
+          <p:nvPicPr>
+            <p:cNvPr id="5" name="图片 4" descr="图形用户界面, 应用程序, Word&#10;&#10;描述已自动生成">
+              <a:extLst>
+                <a:ext uri="{FF2B5EF4-FFF2-40B4-BE49-F238E27FC236}">
+                  <a16:creationId xmlns:a16="http://schemas.microsoft.com/office/drawing/2014/main" id="{00F080B2-7168-2F5F-9C28-388D3D5F474B}"/>
+                </a:ext>
+              </a:extLst>
+            </p:cNvPr>
+            <p:cNvPicPr>
+              <a:picLocks noChangeAspect="1"/>
+            </p:cNvPicPr>
+            <p:nvPr/>
+          </p:nvPicPr>
+          <p:blipFill>
+            <a:blip r:embed="rId2">
+              <a:extLst>
+                <a:ext uri="{28A0092B-C50C-407E-A947-70E740481C1C}">
+                  <a14:useLocalDpi xmlns:a14="http://schemas.microsoft.com/office/drawing/2010/main" val="0"/>
+                </a:ext>
+              </a:extLst>
+            </a:blip>
+            <a:stretch>
+              <a:fillRect/>
+            </a:stretch>
+          </p:blipFill>
+          <p:spPr>
+            <a:xfrm>
+              <a:off x="4183842" y="142851"/>
+              <a:ext cx="3824315" cy="6572298"/>
+            </a:xfrm>
+            <a:prstGeom prst="rect">
+              <a:avLst/>
+            </a:prstGeom>
+          </p:spPr>
+        </p:pic>
+        <p:pic>
+          <p:nvPicPr>
+            <p:cNvPr id="7" name="图片 6" descr="图示&#10;&#10;描述已自动生成">
+              <a:extLst>
+                <a:ext uri="{FF2B5EF4-FFF2-40B4-BE49-F238E27FC236}">
+                  <a16:creationId xmlns:a16="http://schemas.microsoft.com/office/drawing/2014/main" id="{30BBF359-2EB9-95D8-5050-94FF57DF7282}"/>
+                </a:ext>
+              </a:extLst>
+            </p:cNvPr>
+            <p:cNvPicPr>
+              <a:picLocks noChangeAspect="1"/>
+            </p:cNvPicPr>
+            <p:nvPr/>
+          </p:nvPicPr>
+          <p:blipFill>
+            <a:blip r:embed="rId3">
+              <a:extLst>
+                <a:ext uri="{28A0092B-C50C-407E-A947-70E740481C1C}">
+                  <a14:useLocalDpi xmlns:a14="http://schemas.microsoft.com/office/drawing/2010/main" val="0"/>
+                </a:ext>
+              </a:extLst>
+            </a:blip>
+            <a:stretch>
+              <a:fillRect/>
+            </a:stretch>
+          </p:blipFill>
+          <p:spPr>
+            <a:xfrm>
+              <a:off x="7587663" y="82591"/>
+              <a:ext cx="3534039" cy="2926080"/>
+            </a:xfrm>
+            <a:prstGeom prst="rect">
+              <a:avLst/>
+            </a:prstGeom>
+          </p:spPr>
+        </p:pic>
+      </p:grpSp>
+    </p:spTree>
+    <p:extLst>
+      <p:ext uri="{BB962C8B-B14F-4D97-AF65-F5344CB8AC3E}">
+        <p14:creationId xmlns:p14="http://schemas.microsoft.com/office/powerpoint/2010/main" val="553208854"/>
+      </p:ext>
+    </p:extLst>
+  </p:cSld>
+  <p:clrMapOvr>
+    <a:masterClrMapping/>
+  </p:clrMapOvr>
+</p:sld>
+</file>
+
 <file path=ppt/theme/theme1.xml><?xml version="1.0" encoding="utf-8"?>
 <a:theme xmlns:a="http://schemas.openxmlformats.org/drawingml/2006/main" name="Office Theme">
   <a:themeElements>

</xml_diff>